<commit_message>
twam removed from agnisookta
</commit_message>
<xml_diff>
--- a/Sookta_Artha/agni_sookta.pptx
+++ b/Sookta_Artha/agni_sookta.pptx
@@ -252,7 +252,7 @@
           <a:p>
             <a:fld id="{BF1F22D6-1FD5-4F0B-A69E-C6566BAAF5BA}" type="datetimeFigureOut">
               <a:rPr lang="en-IN" smtClean="0"/>
-              <a:t>22-03-2022</a:t>
+              <a:t>23-03-2022</a:t>
             </a:fld>
             <a:endParaRPr lang="en-IN"/>
           </a:p>
@@ -422,7 +422,7 @@
           <a:p>
             <a:fld id="{BF1F22D6-1FD5-4F0B-A69E-C6566BAAF5BA}" type="datetimeFigureOut">
               <a:rPr lang="en-IN" smtClean="0"/>
-              <a:t>22-03-2022</a:t>
+              <a:t>23-03-2022</a:t>
             </a:fld>
             <a:endParaRPr lang="en-IN"/>
           </a:p>
@@ -602,7 +602,7 @@
           <a:p>
             <a:fld id="{BF1F22D6-1FD5-4F0B-A69E-C6566BAAF5BA}" type="datetimeFigureOut">
               <a:rPr lang="en-IN" smtClean="0"/>
-              <a:t>22-03-2022</a:t>
+              <a:t>23-03-2022</a:t>
             </a:fld>
             <a:endParaRPr lang="en-IN"/>
           </a:p>
@@ -772,7 +772,7 @@
           <a:p>
             <a:fld id="{BF1F22D6-1FD5-4F0B-A69E-C6566BAAF5BA}" type="datetimeFigureOut">
               <a:rPr lang="en-IN" smtClean="0"/>
-              <a:t>22-03-2022</a:t>
+              <a:t>23-03-2022</a:t>
             </a:fld>
             <a:endParaRPr lang="en-IN"/>
           </a:p>
@@ -1016,7 +1016,7 @@
           <a:p>
             <a:fld id="{BF1F22D6-1FD5-4F0B-A69E-C6566BAAF5BA}" type="datetimeFigureOut">
               <a:rPr lang="en-IN" smtClean="0"/>
-              <a:t>22-03-2022</a:t>
+              <a:t>23-03-2022</a:t>
             </a:fld>
             <a:endParaRPr lang="en-IN"/>
           </a:p>
@@ -1248,7 +1248,7 @@
           <a:p>
             <a:fld id="{BF1F22D6-1FD5-4F0B-A69E-C6566BAAF5BA}" type="datetimeFigureOut">
               <a:rPr lang="en-IN" smtClean="0"/>
-              <a:t>22-03-2022</a:t>
+              <a:t>23-03-2022</a:t>
             </a:fld>
             <a:endParaRPr lang="en-IN"/>
           </a:p>
@@ -1615,7 +1615,7 @@
           <a:p>
             <a:fld id="{BF1F22D6-1FD5-4F0B-A69E-C6566BAAF5BA}" type="datetimeFigureOut">
               <a:rPr lang="en-IN" smtClean="0"/>
-              <a:t>22-03-2022</a:t>
+              <a:t>23-03-2022</a:t>
             </a:fld>
             <a:endParaRPr lang="en-IN"/>
           </a:p>
@@ -1733,7 +1733,7 @@
           <a:p>
             <a:fld id="{BF1F22D6-1FD5-4F0B-A69E-C6566BAAF5BA}" type="datetimeFigureOut">
               <a:rPr lang="en-IN" smtClean="0"/>
-              <a:t>22-03-2022</a:t>
+              <a:t>23-03-2022</a:t>
             </a:fld>
             <a:endParaRPr lang="en-IN"/>
           </a:p>
@@ -1828,7 +1828,7 @@
           <a:p>
             <a:fld id="{BF1F22D6-1FD5-4F0B-A69E-C6566BAAF5BA}" type="datetimeFigureOut">
               <a:rPr lang="en-IN" smtClean="0"/>
-              <a:t>22-03-2022</a:t>
+              <a:t>23-03-2022</a:t>
             </a:fld>
             <a:endParaRPr lang="en-IN"/>
           </a:p>
@@ -2105,7 +2105,7 @@
           <a:p>
             <a:fld id="{BF1F22D6-1FD5-4F0B-A69E-C6566BAAF5BA}" type="datetimeFigureOut">
               <a:rPr lang="en-IN" smtClean="0"/>
-              <a:t>22-03-2022</a:t>
+              <a:t>23-03-2022</a:t>
             </a:fld>
             <a:endParaRPr lang="en-IN"/>
           </a:p>
@@ -2362,7 +2362,7 @@
           <a:p>
             <a:fld id="{BF1F22D6-1FD5-4F0B-A69E-C6566BAAF5BA}" type="datetimeFigureOut">
               <a:rPr lang="en-IN" smtClean="0"/>
-              <a:t>22-03-2022</a:t>
+              <a:t>23-03-2022</a:t>
             </a:fld>
             <a:endParaRPr lang="en-IN"/>
           </a:p>
@@ -2575,7 +2575,7 @@
           <a:p>
             <a:fld id="{BF1F22D6-1FD5-4F0B-A69E-C6566BAAF5BA}" type="datetimeFigureOut">
               <a:rPr lang="en-IN" smtClean="0"/>
-              <a:t>22-03-2022</a:t>
+              <a:t>23-03-2022</a:t>
             </a:fld>
             <a:endParaRPr lang="en-IN"/>
           </a:p>
@@ -3022,11 +3022,23 @@
                   <a:srgbClr val="FF0000"/>
                 </a:solidFill>
               </a:rPr>
-              <a:t>हे अग्ने देव त्वं </a:t>
+              <a:t>हे अग्ने </a:t>
+            </a:r>
+            <a:r>
+              <a:rPr lang="sa-IN" sz="3200" dirty="0" smtClean="0">
+                <a:solidFill>
+                  <a:srgbClr val="FF0000"/>
+                </a:solidFill>
+              </a:rPr>
+              <a:t>देव </a:t>
             </a:r>
             <a:r>
               <a:rPr lang="kn-IN" sz="3200" dirty="0" smtClean="0"/>
-              <a:t>ಹೇ ಅಗ್ನಿ ದೇವನೇ , ನೀನು</a:t>
+              <a:t>ಹೇ ಅಗ್ನಿ </a:t>
+            </a:r>
+            <a:r>
+              <a:rPr lang="kn-IN" sz="3200" dirty="0" smtClean="0"/>
+              <a:t>ದೇವನೇ</a:t>
             </a:r>
             <a:r>
               <a:rPr lang="sa-IN" sz="3200" dirty="0" smtClean="0"/>

</xml_diff>

<commit_message>
mantra line in agnisookta
</commit_message>
<xml_diff>
--- a/Sookta_Artha/agni_sookta.pptx
+++ b/Sookta_Artha/agni_sookta.pptx
@@ -246,7 +246,7 @@
           <a:p>
             <a:fld id="{BF1F22D6-1FD5-4F0B-A69E-C6566BAAF5BA}" type="datetimeFigureOut">
               <a:rPr lang="en-IN" smtClean="0"/>
-              <a:t>23-03-2022</a:t>
+              <a:t>26-03-2022</a:t>
             </a:fld>
             <a:endParaRPr lang="en-IN"/>
           </a:p>
@@ -416,7 +416,7 @@
           <a:p>
             <a:fld id="{BF1F22D6-1FD5-4F0B-A69E-C6566BAAF5BA}" type="datetimeFigureOut">
               <a:rPr lang="en-IN" smtClean="0"/>
-              <a:t>23-03-2022</a:t>
+              <a:t>26-03-2022</a:t>
             </a:fld>
             <a:endParaRPr lang="en-IN"/>
           </a:p>
@@ -596,7 +596,7 @@
           <a:p>
             <a:fld id="{BF1F22D6-1FD5-4F0B-A69E-C6566BAAF5BA}" type="datetimeFigureOut">
               <a:rPr lang="en-IN" smtClean="0"/>
-              <a:t>23-03-2022</a:t>
+              <a:t>26-03-2022</a:t>
             </a:fld>
             <a:endParaRPr lang="en-IN"/>
           </a:p>
@@ -766,7 +766,7 @@
           <a:p>
             <a:fld id="{BF1F22D6-1FD5-4F0B-A69E-C6566BAAF5BA}" type="datetimeFigureOut">
               <a:rPr lang="en-IN" smtClean="0"/>
-              <a:t>23-03-2022</a:t>
+              <a:t>26-03-2022</a:t>
             </a:fld>
             <a:endParaRPr lang="en-IN"/>
           </a:p>
@@ -1010,7 +1010,7 @@
           <a:p>
             <a:fld id="{BF1F22D6-1FD5-4F0B-A69E-C6566BAAF5BA}" type="datetimeFigureOut">
               <a:rPr lang="en-IN" smtClean="0"/>
-              <a:t>23-03-2022</a:t>
+              <a:t>26-03-2022</a:t>
             </a:fld>
             <a:endParaRPr lang="en-IN"/>
           </a:p>
@@ -1242,7 +1242,7 @@
           <a:p>
             <a:fld id="{BF1F22D6-1FD5-4F0B-A69E-C6566BAAF5BA}" type="datetimeFigureOut">
               <a:rPr lang="en-IN" smtClean="0"/>
-              <a:t>23-03-2022</a:t>
+              <a:t>26-03-2022</a:t>
             </a:fld>
             <a:endParaRPr lang="en-IN"/>
           </a:p>
@@ -1609,7 +1609,7 @@
           <a:p>
             <a:fld id="{BF1F22D6-1FD5-4F0B-A69E-C6566BAAF5BA}" type="datetimeFigureOut">
               <a:rPr lang="en-IN" smtClean="0"/>
-              <a:t>23-03-2022</a:t>
+              <a:t>26-03-2022</a:t>
             </a:fld>
             <a:endParaRPr lang="en-IN"/>
           </a:p>
@@ -1727,7 +1727,7 @@
           <a:p>
             <a:fld id="{BF1F22D6-1FD5-4F0B-A69E-C6566BAAF5BA}" type="datetimeFigureOut">
               <a:rPr lang="en-IN" smtClean="0"/>
-              <a:t>23-03-2022</a:t>
+              <a:t>26-03-2022</a:t>
             </a:fld>
             <a:endParaRPr lang="en-IN"/>
           </a:p>
@@ -1822,7 +1822,7 @@
           <a:p>
             <a:fld id="{BF1F22D6-1FD5-4F0B-A69E-C6566BAAF5BA}" type="datetimeFigureOut">
               <a:rPr lang="en-IN" smtClean="0"/>
-              <a:t>23-03-2022</a:t>
+              <a:t>26-03-2022</a:t>
             </a:fld>
             <a:endParaRPr lang="en-IN"/>
           </a:p>
@@ -2099,7 +2099,7 @@
           <a:p>
             <a:fld id="{BF1F22D6-1FD5-4F0B-A69E-C6566BAAF5BA}" type="datetimeFigureOut">
               <a:rPr lang="en-IN" smtClean="0"/>
-              <a:t>23-03-2022</a:t>
+              <a:t>26-03-2022</a:t>
             </a:fld>
             <a:endParaRPr lang="en-IN"/>
           </a:p>
@@ -2356,7 +2356,7 @@
           <a:p>
             <a:fld id="{BF1F22D6-1FD5-4F0B-A69E-C6566BAAF5BA}" type="datetimeFigureOut">
               <a:rPr lang="en-IN" smtClean="0"/>
-              <a:t>23-03-2022</a:t>
+              <a:t>26-03-2022</a:t>
             </a:fld>
             <a:endParaRPr lang="en-IN"/>
           </a:p>
@@ -2569,7 +2569,7 @@
           <a:p>
             <a:fld id="{BF1F22D6-1FD5-4F0B-A69E-C6566BAAF5BA}" type="datetimeFigureOut">
               <a:rPr lang="en-IN" smtClean="0"/>
-              <a:t>23-03-2022</a:t>
+              <a:t>26-03-2022</a:t>
             </a:fld>
             <a:endParaRPr lang="en-IN"/>
           </a:p>
@@ -2995,7 +2995,7 @@
         </p:nvSpPr>
         <p:spPr>
           <a:xfrm>
-            <a:off x="332510" y="457200"/>
+            <a:off x="394855" y="457200"/>
             <a:ext cx="6068290" cy="9414164"/>
           </a:xfrm>
         </p:spPr>
@@ -3016,7 +3016,15 @@
                   <a:srgbClr val="FF0000"/>
                 </a:solidFill>
               </a:rPr>
-              <a:t>हे अग्ने देव </a:t>
+              <a:t>हे </a:t>
+            </a:r>
+            <a:r>
+              <a:rPr lang="sa-IN" sz="3200" dirty="0" smtClean="0">
+                <a:solidFill>
+                  <a:srgbClr val="FF0000"/>
+                </a:solidFill>
+              </a:rPr>
+              <a:t>अग्ने देव </a:t>
             </a:r>
             <a:r>
               <a:rPr lang="kn-IN" sz="3200" dirty="0" smtClean="0"/>
@@ -3292,28 +3300,36 @@
             </a:r>
             <a:r>
               <a:rPr lang="sa-IN" sz="3200" dirty="0" smtClean="0"/>
-              <a:t> ।</a:t>
-            </a:r>
-            <a:r>
-              <a:rPr lang="en-IN" sz="3200" dirty="0" smtClean="0"/>
-              <a:t/>
+              <a:t> </a:t>
+            </a:r>
+            <a:r>
+              <a:rPr lang="sa-IN" sz="3200" dirty="0" smtClean="0"/>
+              <a:t>।</a:t>
             </a:r>
             <a:br>
-              <a:rPr lang="en-IN" sz="3200" dirty="0" smtClean="0"/>
+              <a:rPr lang="sa-IN" sz="3200" dirty="0" smtClean="0"/>
             </a:br>
             <a:r>
-              <a:rPr lang="en-IN" sz="3200" dirty="0"/>
+              <a:rPr lang="sa-IN" sz="3200" dirty="0"/>
               <a:t>	</a:t>
             </a:r>
             <a:r>
-              <a:rPr lang="en-IN" sz="3200" dirty="0" smtClean="0"/>
+              <a:rPr lang="sa-IN" sz="3200" dirty="0" smtClean="0"/>
               <a:t>	</a:t>
             </a:r>
             <a:r>
-              <a:rPr lang="sa-IN" sz="3200" dirty="0" smtClean="0"/>
-              <a:t>		अग्निसूक्त 1</a:t>
-            </a:r>
-            <a:endParaRPr lang="en-IN" sz="3200" dirty="0"/>
+              <a:rPr lang="sa-IN" sz="1600" dirty="0" smtClean="0"/>
+              <a:t>अग्ने नय ... नमउक्तिं विधेम ।   </a:t>
+            </a:r>
+            <a:r>
+              <a:rPr lang="sa-IN" sz="1600" dirty="0" smtClean="0"/>
+              <a:t>अग्निसूक्त </a:t>
+            </a:r>
+            <a:r>
+              <a:rPr lang="sa-IN" sz="1600" dirty="0" smtClean="0"/>
+              <a:t>1</a:t>
+            </a:r>
+            <a:endParaRPr lang="en-IN" sz="1200" dirty="0"/>
           </a:p>
         </p:txBody>
       </p:sp>
@@ -3670,19 +3686,23 @@
               <a:rPr lang="en-IN" sz="3200" dirty="0" smtClean="0"/>
             </a:br>
             <a:r>
-              <a:rPr lang="en-IN" sz="3200" dirty="0"/>
+              <a:rPr lang="en-IN" sz="1200" dirty="0"/>
               <a:t>	</a:t>
             </a:r>
             <a:r>
-              <a:rPr lang="en-IN" sz="3200" dirty="0" smtClean="0"/>
+              <a:rPr lang="en-IN" sz="1200" dirty="0" smtClean="0"/>
               <a:t>	</a:t>
             </a:r>
             <a:r>
-              <a:rPr lang="sa-IN" sz="3200" dirty="0" smtClean="0"/>
-              <a:t>		अग्निसूक्त </a:t>
-            </a:r>
-            <a:r>
-              <a:rPr lang="en-IN" sz="3200" dirty="0" smtClean="0"/>
+              <a:rPr lang="sa-IN" sz="1200" dirty="0" smtClean="0"/>
+              <a:t>	</a:t>
+            </a:r>
+            <a:r>
+              <a:rPr lang="sa-IN" sz="1400" dirty="0" smtClean="0"/>
+              <a:t>प्रवः शुक्राय ... विद्मना जिगाति । अग्निसूक्त </a:t>
+            </a:r>
+            <a:r>
+              <a:rPr lang="en-IN" sz="1400" dirty="0" smtClean="0"/>
               <a:t>2</a:t>
             </a:r>
             <a:endParaRPr lang="en-IN" sz="3200" dirty="0"/>
@@ -3985,14 +4005,18 @@
             </a:br>
             <a:r>
               <a:rPr lang="en-IN" sz="3200" dirty="0" smtClean="0"/>
-              <a:t>		</a:t>
-            </a:r>
-            <a:r>
-              <a:rPr lang="sa-IN" sz="3200" dirty="0" smtClean="0"/>
-              <a:t>		अग्निसूक्त </a:t>
-            </a:r>
-            <a:r>
-              <a:rPr lang="kn-IN" sz="3200" dirty="0"/>
+              <a:t>	</a:t>
+            </a:r>
+            <a:r>
+              <a:rPr lang="en-IN" sz="1600" dirty="0" smtClean="0"/>
+              <a:t>	</a:t>
+            </a:r>
+            <a:r>
+              <a:rPr lang="sa-IN" sz="1600" dirty="0" smtClean="0"/>
+              <a:t>अच्छा गिरो ... अरतिं मानुषाणाम् । अग्निसूक्त </a:t>
+            </a:r>
+            <a:r>
+              <a:rPr lang="kn-IN" sz="1600" dirty="0"/>
               <a:t>3</a:t>
             </a:r>
             <a:endParaRPr lang="en-IN" sz="3200" dirty="0"/>
@@ -4315,18 +4339,18 @@
               <a:rPr lang="kn-IN" sz="3200" dirty="0"/>
             </a:br>
             <a:r>
-              <a:rPr lang="en-IN" sz="3200" dirty="0" smtClean="0"/>
-              <a:t>	</a:t>
-            </a:r>
-            <a:r>
-              <a:rPr lang="sa-IN" sz="3200" dirty="0" smtClean="0"/>
-              <a:t>		अग्निसूक्त </a:t>
-            </a:r>
-            <a:r>
-              <a:rPr lang="kn-IN" sz="3200" dirty="0"/>
+              <a:rPr lang="sa-IN" sz="1600" dirty="0" smtClean="0"/>
+              <a:t>अग्ने त्वमस्मद्युयोध्यमीवाः...अजरेभिर्यजत्र । </a:t>
+            </a:r>
+            <a:r>
+              <a:rPr lang="sa-IN" sz="1800" dirty="0" smtClean="0"/>
+              <a:t>अग्निसूक्त </a:t>
+            </a:r>
+            <a:r>
+              <a:rPr lang="kn-IN" sz="1800" dirty="0"/>
               <a:t>4</a:t>
             </a:r>
-            <a:endParaRPr lang="en-IN" sz="3200" dirty="0"/>
+            <a:endParaRPr lang="en-IN" sz="2000" dirty="0"/>
           </a:p>
         </p:txBody>
       </p:sp>

</xml_diff>